<commit_message>
no class for march 4
</commit_message>
<xml_diff>
--- a/files/5 performance reviews.pptx
+++ b/files/5 performance reviews.pptx
@@ -154,22 +154,6 @@
     </pc:docChg>
   </pc:docChgLst>
   <pc:docChgLst>
-    <pc:chgData name="Steven Yackel" userId="4b0ae51a7568ddbd" providerId="LiveId" clId="{9C6C6C63-96F8-477E-8532-981C99469FEA}"/>
-    <pc:docChg chg="modSld sldOrd">
-      <pc:chgData name="Steven Yackel" userId="4b0ae51a7568ddbd" providerId="LiveId" clId="{9C6C6C63-96F8-477E-8532-981C99469FEA}" dt="2023-03-07T22:19:12.885" v="1"/>
-      <pc:docMkLst>
-        <pc:docMk/>
-      </pc:docMkLst>
-      <pc:sldChg chg="ord">
-        <pc:chgData name="Steven Yackel" userId="4b0ae51a7568ddbd" providerId="LiveId" clId="{9C6C6C63-96F8-477E-8532-981C99469FEA}" dt="2023-03-07T22:19:12.885" v="1"/>
-        <pc:sldMkLst>
-          <pc:docMk/>
-          <pc:sldMk cId="3369168592" sldId="263"/>
-        </pc:sldMkLst>
-      </pc:sldChg>
-    </pc:docChg>
-  </pc:docChgLst>
-  <pc:docChgLst>
     <pc:chgData name="Steven Yackel" userId="4b0ae51a7568ddbd" providerId="LiveId" clId="{31580823-2A87-497C-952D-4FCF37BF8BC7}"/>
     <pc:docChg chg="undo custSel mod addSld delSld modSld">
       <pc:chgData name="Steven Yackel" userId="4b0ae51a7568ddbd" providerId="LiveId" clId="{31580823-2A87-497C-952D-4FCF37BF8BC7}" dt="2019-03-05T22:45:00.298" v="2223" actId="20577"/>
@@ -291,6 +275,22 @@
             <ac:spMk id="3" creationId="{40578F50-F58D-4170-912B-FC3438DEC845}"/>
           </ac:spMkLst>
         </pc:spChg>
+      </pc:sldChg>
+    </pc:docChg>
+  </pc:docChgLst>
+  <pc:docChgLst>
+    <pc:chgData name="Steven Yackel" userId="4b0ae51a7568ddbd" providerId="LiveId" clId="{9C6C6C63-96F8-477E-8532-981C99469FEA}"/>
+    <pc:docChg chg="modSld sldOrd">
+      <pc:chgData name="Steven Yackel" userId="4b0ae51a7568ddbd" providerId="LiveId" clId="{9C6C6C63-96F8-477E-8532-981C99469FEA}" dt="2023-03-07T22:19:12.885" v="1"/>
+      <pc:docMkLst>
+        <pc:docMk/>
+      </pc:docMkLst>
+      <pc:sldChg chg="ord">
+        <pc:chgData name="Steven Yackel" userId="4b0ae51a7568ddbd" providerId="LiveId" clId="{9C6C6C63-96F8-477E-8532-981C99469FEA}" dt="2023-03-07T22:19:12.885" v="1"/>
+        <pc:sldMkLst>
+          <pc:docMk/>
+          <pc:sldMk cId="3369168592" sldId="263"/>
+        </pc:sldMkLst>
       </pc:sldChg>
     </pc:docChg>
   </pc:docChgLst>
@@ -846,7 +846,7 @@
           <a:p>
             <a:fld id="{FE485A84-7142-47F3-8514-4D578ABBE4F2}" type="datetimeFigureOut">
               <a:rPr lang="en-US" smtClean="0"/>
-              <a:t>3/7/2023</a:t>
+              <a:t>2/25/2025</a:t>
             </a:fld>
             <a:endParaRPr lang="en-US"/>
           </a:p>
@@ -1806,7 +1806,7 @@
           <a:p>
             <a:fld id="{A99EADCD-02B2-4ED1-A4B8-29CF33335342}" type="datetimeFigureOut">
               <a:rPr lang="en-US" smtClean="0"/>
-              <a:t>3/7/2023</a:t>
+              <a:t>2/25/2025</a:t>
             </a:fld>
             <a:endParaRPr lang="en-US"/>
           </a:p>
@@ -2081,7 +2081,7 @@
           <a:p>
             <a:fld id="{A99EADCD-02B2-4ED1-A4B8-29CF33335342}" type="datetimeFigureOut">
               <a:rPr lang="en-US" smtClean="0"/>
-              <a:t>3/7/2023</a:t>
+              <a:t>2/25/2025</a:t>
             </a:fld>
             <a:endParaRPr lang="en-US"/>
           </a:p>
@@ -2275,7 +2275,7 @@
           <a:p>
             <a:fld id="{A99EADCD-02B2-4ED1-A4B8-29CF33335342}" type="datetimeFigureOut">
               <a:rPr lang="en-US" smtClean="0"/>
-              <a:t>3/7/2023</a:t>
+              <a:t>2/25/2025</a:t>
             </a:fld>
             <a:endParaRPr lang="en-US"/>
           </a:p>
@@ -2548,7 +2548,7 @@
           <a:p>
             <a:fld id="{A99EADCD-02B2-4ED1-A4B8-29CF33335342}" type="datetimeFigureOut">
               <a:rPr lang="en-US" smtClean="0"/>
-              <a:t>3/7/2023</a:t>
+              <a:t>2/25/2025</a:t>
             </a:fld>
             <a:endParaRPr lang="en-US"/>
           </a:p>
@@ -2889,7 +2889,7 @@
           <a:p>
             <a:fld id="{A99EADCD-02B2-4ED1-A4B8-29CF33335342}" type="datetimeFigureOut">
               <a:rPr lang="en-US" smtClean="0"/>
-              <a:t>3/7/2023</a:t>
+              <a:t>2/25/2025</a:t>
             </a:fld>
             <a:endParaRPr lang="en-US"/>
           </a:p>
@@ -3512,7 +3512,7 @@
           <a:p>
             <a:fld id="{A99EADCD-02B2-4ED1-A4B8-29CF33335342}" type="datetimeFigureOut">
               <a:rPr lang="en-US" smtClean="0"/>
-              <a:t>3/7/2023</a:t>
+              <a:t>2/25/2025</a:t>
             </a:fld>
             <a:endParaRPr lang="en-US"/>
           </a:p>
@@ -4372,7 +4372,7 @@
           <a:p>
             <a:fld id="{A99EADCD-02B2-4ED1-A4B8-29CF33335342}" type="datetimeFigureOut">
               <a:rPr lang="en-US" smtClean="0"/>
-              <a:t>3/7/2023</a:t>
+              <a:t>2/25/2025</a:t>
             </a:fld>
             <a:endParaRPr lang="en-US"/>
           </a:p>
@@ -4542,7 +4542,7 @@
           <a:p>
             <a:fld id="{A99EADCD-02B2-4ED1-A4B8-29CF33335342}" type="datetimeFigureOut">
               <a:rPr lang="en-US" smtClean="0"/>
-              <a:t>3/7/2023</a:t>
+              <a:t>2/25/2025</a:t>
             </a:fld>
             <a:endParaRPr lang="en-US"/>
           </a:p>
@@ -4722,7 +4722,7 @@
           <a:p>
             <a:fld id="{A99EADCD-02B2-4ED1-A4B8-29CF33335342}" type="datetimeFigureOut">
               <a:rPr lang="en-US" smtClean="0"/>
-              <a:t>3/7/2023</a:t>
+              <a:t>2/25/2025</a:t>
             </a:fld>
             <a:endParaRPr lang="en-US"/>
           </a:p>
@@ -4892,7 +4892,7 @@
           <a:p>
             <a:fld id="{A99EADCD-02B2-4ED1-A4B8-29CF33335342}" type="datetimeFigureOut">
               <a:rPr lang="en-US" smtClean="0"/>
-              <a:t>3/7/2023</a:t>
+              <a:t>2/25/2025</a:t>
             </a:fld>
             <a:endParaRPr lang="en-US"/>
           </a:p>
@@ -5139,7 +5139,7 @@
           <a:p>
             <a:fld id="{A99EADCD-02B2-4ED1-A4B8-29CF33335342}" type="datetimeFigureOut">
               <a:rPr lang="en-US" smtClean="0"/>
-              <a:t>3/7/2023</a:t>
+              <a:t>2/25/2025</a:t>
             </a:fld>
             <a:endParaRPr lang="en-US"/>
           </a:p>
@@ -5431,7 +5431,7 @@
           <a:p>
             <a:fld id="{A99EADCD-02B2-4ED1-A4B8-29CF33335342}" type="datetimeFigureOut">
               <a:rPr lang="en-US" smtClean="0"/>
-              <a:t>3/7/2023</a:t>
+              <a:t>2/25/2025</a:t>
             </a:fld>
             <a:endParaRPr lang="en-US"/>
           </a:p>
@@ -5875,7 +5875,7 @@
           <a:p>
             <a:fld id="{A99EADCD-02B2-4ED1-A4B8-29CF33335342}" type="datetimeFigureOut">
               <a:rPr lang="en-US" smtClean="0"/>
-              <a:t>3/7/2023</a:t>
+              <a:t>2/25/2025</a:t>
             </a:fld>
             <a:endParaRPr lang="en-US"/>
           </a:p>
@@ -5993,7 +5993,7 @@
           <a:p>
             <a:fld id="{A99EADCD-02B2-4ED1-A4B8-29CF33335342}" type="datetimeFigureOut">
               <a:rPr lang="en-US" smtClean="0"/>
-              <a:t>3/7/2023</a:t>
+              <a:t>2/25/2025</a:t>
             </a:fld>
             <a:endParaRPr lang="en-US"/>
           </a:p>
@@ -6088,7 +6088,7 @@
           <a:p>
             <a:fld id="{A99EADCD-02B2-4ED1-A4B8-29CF33335342}" type="datetimeFigureOut">
               <a:rPr lang="en-US" smtClean="0"/>
-              <a:t>3/7/2023</a:t>
+              <a:t>2/25/2025</a:t>
             </a:fld>
             <a:endParaRPr lang="en-US"/>
           </a:p>
@@ -6367,7 +6367,7 @@
           <a:p>
             <a:fld id="{A99EADCD-02B2-4ED1-A4B8-29CF33335342}" type="datetimeFigureOut">
               <a:rPr lang="en-US" smtClean="0"/>
-              <a:t>3/7/2023</a:t>
+              <a:t>2/25/2025</a:t>
             </a:fld>
             <a:endParaRPr lang="en-US"/>
           </a:p>
@@ -6642,7 +6642,7 @@
           <a:p>
             <a:fld id="{A99EADCD-02B2-4ED1-A4B8-29CF33335342}" type="datetimeFigureOut">
               <a:rPr lang="en-US" smtClean="0"/>
-              <a:t>3/7/2023</a:t>
+              <a:t>2/25/2025</a:t>
             </a:fld>
             <a:endParaRPr lang="en-US"/>
           </a:p>
@@ -7071,7 +7071,7 @@
           <a:p>
             <a:fld id="{A99EADCD-02B2-4ED1-A4B8-29CF33335342}" type="datetimeFigureOut">
               <a:rPr lang="en-US" smtClean="0"/>
-              <a:t>3/7/2023</a:t>
+              <a:t>2/25/2025</a:t>
             </a:fld>
             <a:endParaRPr lang="en-US"/>
           </a:p>
@@ -8485,45 +8485,6 @@
       </p:sp>
       <p:sp>
         <p:nvSpPr>
-          <p:cNvPr id="6" name="Rectangle 5">
-            <a:extLst>
-              <a:ext uri="{FF2B5EF4-FFF2-40B4-BE49-F238E27FC236}">
-                <a16:creationId xmlns:a16="http://schemas.microsoft.com/office/drawing/2014/main" id="{309C195B-80AB-4AB4-AB09-7B168A5D694D}"/>
-              </a:ext>
-            </a:extLst>
-          </p:cNvPr>
-          <p:cNvSpPr/>
-          <p:nvPr/>
-        </p:nvSpPr>
-        <p:spPr>
-          <a:xfrm>
-            <a:off x="8284327" y="5920953"/>
-            <a:ext cx="1515402" cy="646331"/>
-          </a:xfrm>
-          <a:prstGeom prst="rect">
-            <a:avLst/>
-          </a:prstGeom>
-        </p:spPr>
-        <p:txBody>
-          <a:bodyPr wrap="square">
-            <a:spAutoFit/>
-          </a:bodyPr>
-          <a:lstStyle/>
-          <a:p>
-            <a:r>
-              <a:rPr lang="en-US" sz="3600" dirty="0">
-                <a:solidFill>
-                  <a:schemeClr val="accent6"/>
-                </a:solidFill>
-                <a:latin typeface="Calibri" panose="020F0502020204030204" pitchFamily="34" charset="0"/>
-              </a:rPr>
-              <a:t>100 / 4</a:t>
-            </a:r>
-          </a:p>
-        </p:txBody>
-      </p:sp>
-      <p:sp>
-        <p:nvSpPr>
           <p:cNvPr id="7" name="Rectangle 6">
             <a:extLst>
               <a:ext uri="{FF2B5EF4-FFF2-40B4-BE49-F238E27FC236}">
@@ -8560,6 +8521,45 @@
                 <a:latin typeface="Calibri" panose="020F0502020204030204" pitchFamily="34" charset="0"/>
               </a:rPr>
               <a:t> Review of the Review:</a:t>
+            </a:r>
+          </a:p>
+        </p:txBody>
+      </p:sp>
+      <p:sp>
+        <p:nvSpPr>
+          <p:cNvPr id="2" name="Rectangle 1">
+            <a:extLst>
+              <a:ext uri="{FF2B5EF4-FFF2-40B4-BE49-F238E27FC236}">
+                <a16:creationId xmlns:a16="http://schemas.microsoft.com/office/drawing/2014/main" id="{71013162-A821-1425-EEFC-4EC7F734FA13}"/>
+              </a:ext>
+            </a:extLst>
+          </p:cNvPr>
+          <p:cNvSpPr/>
+          <p:nvPr/>
+        </p:nvSpPr>
+        <p:spPr>
+          <a:xfrm>
+            <a:off x="8352907" y="5920954"/>
+            <a:ext cx="985058" cy="646331"/>
+          </a:xfrm>
+          <a:prstGeom prst="rect">
+            <a:avLst/>
+          </a:prstGeom>
+        </p:spPr>
+        <p:txBody>
+          <a:bodyPr wrap="square">
+            <a:spAutoFit/>
+          </a:bodyPr>
+          <a:lstStyle/>
+          <a:p>
+            <a:r>
+              <a:rPr lang="en-US" sz="3600" dirty="0">
+                <a:solidFill>
+                  <a:srgbClr val="00B050"/>
+                </a:solidFill>
+                <a:latin typeface="Calibri" panose="020F0502020204030204" pitchFamily="34" charset="0"/>
+              </a:rPr>
+              <a:t>3/4</a:t>
             </a:r>
           </a:p>
         </p:txBody>
@@ -8686,13 +8686,10 @@
                             </p:stCondLst>
                             <p:childTnLst>
                               <p:par>
-                                <p:cTn id="11" presetID="42" presetClass="entr" presetSubtype="0" fill="hold" grpId="1" nodeType="clickEffect">
+                                <p:cTn id="11" presetID="2" presetClass="entr" presetSubtype="4" fill="hold" grpId="0" nodeType="clickEffect">
                                   <p:stCondLst>
                                     <p:cond delay="0"/>
                                   </p:stCondLst>
-                                  <p:iterate type="lt">
-                                    <p:tmPct val="0"/>
-                                  </p:iterate>
                                   <p:childTnLst>
                                     <p:set>
                                       <p:cBhvr>
@@ -8702,7 +8699,7 @@
                                           </p:stCondLst>
                                         </p:cTn>
                                         <p:tgtEl>
-                                          <p:spTgt spid="6"/>
+                                          <p:spTgt spid="2"/>
                                         </p:tgtEl>
                                         <p:attrNameLst>
                                           <p:attrName>style.visibility</p:attrName>
@@ -8712,19 +8709,11 @@
                                         <p:strVal val="visible"/>
                                       </p:to>
                                     </p:set>
-                                    <p:animEffect transition="in" filter="fade">
-                                      <p:cBhvr>
-                                        <p:cTn id="13" dur="1000"/>
+                                    <p:anim calcmode="lin" valueType="num">
+                                      <p:cBhvr additive="base">
+                                        <p:cTn id="13" dur="500" fill="hold"/>
                                         <p:tgtEl>
-                                          <p:spTgt spid="6"/>
-                                        </p:tgtEl>
-                                      </p:cBhvr>
-                                    </p:animEffect>
-                                    <p:anim calcmode="lin" valueType="num">
-                                      <p:cBhvr>
-                                        <p:cTn id="14" dur="1000" fill="hold"/>
-                                        <p:tgtEl>
-                                          <p:spTgt spid="6"/>
+                                          <p:spTgt spid="2"/>
                                         </p:tgtEl>
                                         <p:attrNameLst>
                                           <p:attrName>ppt_x</p:attrName>
@@ -8744,10 +8733,10 @@
                                       </p:tavLst>
                                     </p:anim>
                                     <p:anim calcmode="lin" valueType="num">
-                                      <p:cBhvr>
-                                        <p:cTn id="15" dur="1000" fill="hold"/>
+                                      <p:cBhvr additive="base">
+                                        <p:cTn id="14" dur="500" fill="hold"/>
                                         <p:tgtEl>
-                                          <p:spTgt spid="6"/>
+                                          <p:spTgt spid="2"/>
                                         </p:tgtEl>
                                         <p:attrNameLst>
                                           <p:attrName>ppt_y</p:attrName>
@@ -8756,7 +8745,7 @@
                                       <p:tavLst>
                                         <p:tav tm="0">
                                           <p:val>
-                                            <p:strVal val="#ppt_y+.1"/>
+                                            <p:strVal val="1+#ppt_h/2"/>
                                           </p:val>
                                         </p:tav>
                                         <p:tav tm="100000">
@@ -8766,120 +8755,6 @@
                                         </p:tav>
                                       </p:tavLst>
                                     </p:anim>
-                                  </p:childTnLst>
-                                </p:cTn>
-                              </p:par>
-                              <p:par>
-                                <p:cTn id="16" presetID="21" presetClass="emph" presetSubtype="0" repeatCount="indefinite" fill="hold" grpId="0" nodeType="withEffect">
-                                  <p:stCondLst>
-                                    <p:cond delay="0"/>
-                                  </p:stCondLst>
-                                  <p:iterate type="lt">
-                                    <p:tmPct val="0"/>
-                                  </p:iterate>
-                                  <p:childTnLst>
-                                    <p:animClr clrSpc="hsl" dir="cw">
-                                      <p:cBhvr override="childStyle">
-                                        <p:cTn id="17" dur="1000" fill="hold"/>
-                                        <p:tgtEl>
-                                          <p:spTgt spid="6"/>
-                                        </p:tgtEl>
-                                        <p:attrNameLst>
-                                          <p:attrName>style.color</p:attrName>
-                                        </p:attrNameLst>
-                                      </p:cBhvr>
-                                      <p:by>
-                                        <p:hsl h="7200000" s="0" l="0"/>
-                                      </p:by>
-                                    </p:animClr>
-                                    <p:animClr clrSpc="hsl" dir="cw">
-                                      <p:cBhvr>
-                                        <p:cTn id="18" dur="1000" fill="hold"/>
-                                        <p:tgtEl>
-                                          <p:spTgt spid="6"/>
-                                        </p:tgtEl>
-                                        <p:attrNameLst>
-                                          <p:attrName>fillcolor</p:attrName>
-                                        </p:attrNameLst>
-                                      </p:cBhvr>
-                                      <p:by>
-                                        <p:hsl h="7200000" s="0" l="0"/>
-                                      </p:by>
-                                    </p:animClr>
-                                    <p:animClr clrSpc="hsl" dir="cw">
-                                      <p:cBhvr>
-                                        <p:cTn id="19" dur="1000" fill="hold"/>
-                                        <p:tgtEl>
-                                          <p:spTgt spid="6"/>
-                                        </p:tgtEl>
-                                        <p:attrNameLst>
-                                          <p:attrName>stroke.color</p:attrName>
-                                        </p:attrNameLst>
-                                      </p:cBhvr>
-                                      <p:by>
-                                        <p:hsl h="7200000" s="0" l="0"/>
-                                      </p:by>
-                                    </p:animClr>
-                                    <p:set>
-                                      <p:cBhvr>
-                                        <p:cTn id="20" dur="1000" fill="hold"/>
-                                        <p:tgtEl>
-                                          <p:spTgt spid="6"/>
-                                        </p:tgtEl>
-                                        <p:attrNameLst>
-                                          <p:attrName>fill.type</p:attrName>
-                                        </p:attrNameLst>
-                                      </p:cBhvr>
-                                      <p:to>
-                                        <p:strVal val="solid"/>
-                                      </p:to>
-                                    </p:set>
-                                  </p:childTnLst>
-                                </p:cTn>
-                              </p:par>
-                              <p:par>
-                                <p:cTn id="21" presetID="1" presetClass="path" presetSubtype="0" accel="50000" decel="50000" autoRev="1" fill="hold" grpId="2" nodeType="withEffect">
-                                  <p:stCondLst>
-                                    <p:cond delay="3000"/>
-                                  </p:stCondLst>
-                                  <p:iterate type="lt">
-                                    <p:tmPct val="10000"/>
-                                  </p:iterate>
-                                  <p:childTnLst>
-                                    <p:animMotion origin="layout" path="M 3.54167E-6 3.33333E-6 C 0.06901 3.33333E-6 0.125 -0.06412 0.125 -0.14283 C 0.125 -0.22176 0.06901 -0.28565 3.54167E-6 -0.28565 C -0.06901 -0.28565 -0.125 -0.22176 -0.125 -0.14283 C -0.125 -0.06412 -0.06901 3.33333E-6 3.54167E-6 3.33333E-6 Z " pathEditMode="relative" rAng="0" ptsTypes="AAAAA">
-                                      <p:cBhvr>
-                                        <p:cTn id="22" dur="3000" fill="hold"/>
-                                        <p:tgtEl>
-                                          <p:spTgt spid="6"/>
-                                        </p:tgtEl>
-                                        <p:attrNameLst>
-                                          <p:attrName>ppt_x</p:attrName>
-                                          <p:attrName>ppt_y</p:attrName>
-                                        </p:attrNameLst>
-                                      </p:cBhvr>
-                                      <p:rCtr x="0" y="-14282"/>
-                                    </p:animMotion>
-                                  </p:childTnLst>
-                                </p:cTn>
-                              </p:par>
-                              <p:par>
-                                <p:cTn id="23" presetID="6" presetClass="emph" presetSubtype="0" fill="hold" grpId="3" nodeType="withEffect">
-                                  <p:stCondLst>
-                                    <p:cond delay="3000"/>
-                                  </p:stCondLst>
-                                  <p:iterate type="lt">
-                                    <p:tmPct val="0"/>
-                                  </p:iterate>
-                                  <p:childTnLst>
-                                    <p:animScale>
-                                      <p:cBhvr>
-                                        <p:cTn id="24" dur="2000" fill="hold"/>
-                                        <p:tgtEl>
-                                          <p:spTgt spid="6"/>
-                                        </p:tgtEl>
-                                      </p:cBhvr>
-                                      <p:by x="200000" y="200000"/>
-                                    </p:animScale>
                                   </p:childTnLst>
                                 </p:cTn>
                               </p:par>
@@ -8911,11 +8786,8 @@
       </p:par>
     </p:tnLst>
     <p:bldLst>
-      <p:bldP spid="6" grpId="0"/>
-      <p:bldP spid="6" grpId="1"/>
-      <p:bldP spid="6" grpId="2"/>
-      <p:bldP spid="6" grpId="3"/>
       <p:bldP spid="7" grpId="0"/>
+      <p:bldP spid="2" grpId="0"/>
     </p:bldLst>
   </p:timing>
 </p:sld>
@@ -11829,7 +11701,7 @@
         <p:spPr/>
         <p:txBody>
           <a:bodyPr>
-            <a:normAutofit lnSpcReduction="10000"/>
+            <a:normAutofit/>
           </a:bodyPr>
           <a:lstStyle/>
           <a:p>
@@ -11884,7 +11756,7 @@
             </a:pPr>
             <a:r>
               <a:rPr lang="en-US" dirty="0"/>
-              <a:t>You will have four reviews of your performance</a:t>
+              <a:t>You will have three reviews of your performance</a:t>
             </a:r>
           </a:p>
           <a:p>
@@ -11896,17 +11768,6 @@
             <a:r>
               <a:rPr lang="en-US" dirty="0"/>
               <a:t>Two peer reviews</a:t>
-            </a:r>
-          </a:p>
-          <a:p>
-            <a:pPr lvl="1">
-              <a:lnSpc>
-                <a:spcPct val="90000"/>
-              </a:lnSpc>
-            </a:pPr>
-            <a:r>
-              <a:rPr lang="en-US" dirty="0"/>
-              <a:t>Manager’s review</a:t>
             </a:r>
           </a:p>
           <a:p>
@@ -12725,15 +12586,33 @@
                                   </p:childTnLst>
                                 </p:cTn>
                               </p:par>
+                            </p:childTnLst>
+                          </p:cTn>
+                        </p:par>
+                      </p:childTnLst>
+                    </p:cTn>
+                  </p:par>
+                  <p:par>
+                    <p:cTn id="48" fill="hold">
+                      <p:stCondLst>
+                        <p:cond delay="indefinite"/>
+                      </p:stCondLst>
+                      <p:childTnLst>
+                        <p:par>
+                          <p:cTn id="49" fill="hold">
+                            <p:stCondLst>
+                              <p:cond delay="0"/>
+                            </p:stCondLst>
+                            <p:childTnLst>
                               <p:par>
-                                <p:cTn id="48" presetID="42" presetClass="entr" presetSubtype="0" fill="hold" nodeType="withEffect">
+                                <p:cTn id="50" presetID="42" presetClass="entr" presetSubtype="0" fill="hold" nodeType="clickEffect">
                                   <p:stCondLst>
                                     <p:cond delay="0"/>
                                   </p:stCondLst>
                                   <p:childTnLst>
                                     <p:set>
                                       <p:cBhvr>
-                                        <p:cTn id="49" dur="1" fill="hold">
+                                        <p:cTn id="51" dur="1" fill="hold">
                                           <p:stCondLst>
                                             <p:cond delay="0"/>
                                           </p:stCondLst>
@@ -12755,7 +12634,7 @@
                                     </p:set>
                                     <p:animEffect transition="in" filter="fade">
                                       <p:cBhvr>
-                                        <p:cTn id="50" dur="1000"/>
+                                        <p:cTn id="52" dur="1000"/>
                                         <p:tgtEl>
                                           <p:spTgt spid="3">
                                             <p:txEl>
@@ -12767,7 +12646,7 @@
                                     </p:animEffect>
                                     <p:anim calcmode="lin" valueType="num">
                                       <p:cBhvr>
-                                        <p:cTn id="51" dur="1000" fill="hold"/>
+                                        <p:cTn id="53" dur="1000" fill="hold"/>
                                         <p:tgtEl>
                                           <p:spTgt spid="3">
                                             <p:txEl>
@@ -12794,7 +12673,7 @@
                                     </p:anim>
                                     <p:anim calcmode="lin" valueType="num">
                                       <p:cBhvr>
-                                        <p:cTn id="52" dur="1000" fill="hold"/>
+                                        <p:cTn id="54" dur="1000" fill="hold"/>
                                         <p:tgtEl>
                                           <p:spTgt spid="3">
                                             <p:txEl>
@@ -12822,26 +12701,8 @@
                                   </p:childTnLst>
                                 </p:cTn>
                               </p:par>
-                            </p:childTnLst>
-                          </p:cTn>
-                        </p:par>
-                      </p:childTnLst>
-                    </p:cTn>
-                  </p:par>
-                  <p:par>
-                    <p:cTn id="53" fill="hold">
-                      <p:stCondLst>
-                        <p:cond delay="indefinite"/>
-                      </p:stCondLst>
-                      <p:childTnLst>
-                        <p:par>
-                          <p:cTn id="54" fill="hold">
-                            <p:stCondLst>
-                              <p:cond delay="0"/>
-                            </p:stCondLst>
-                            <p:childTnLst>
                               <p:par>
-                                <p:cTn id="55" presetID="42" presetClass="entr" presetSubtype="0" fill="hold" nodeType="clickEffect">
+                                <p:cTn id="55" presetID="42" presetClass="entr" presetSubtype="0" fill="hold" nodeType="withEffect">
                                   <p:stCondLst>
                                     <p:cond delay="0"/>
                                   </p:stCondLst>
@@ -12914,103 +12775,6 @@
                                           <p:spTgt spid="3">
                                             <p:txEl>
                                               <p:pRg st="8" end="8"/>
-                                            </p:txEl>
-                                          </p:spTgt>
-                                        </p:tgtEl>
-                                        <p:attrNameLst>
-                                          <p:attrName>ppt_y</p:attrName>
-                                        </p:attrNameLst>
-                                      </p:cBhvr>
-                                      <p:tavLst>
-                                        <p:tav tm="0">
-                                          <p:val>
-                                            <p:strVal val="#ppt_y+.1"/>
-                                          </p:val>
-                                        </p:tav>
-                                        <p:tav tm="100000">
-                                          <p:val>
-                                            <p:strVal val="#ppt_y"/>
-                                          </p:val>
-                                        </p:tav>
-                                      </p:tavLst>
-                                    </p:anim>
-                                  </p:childTnLst>
-                                </p:cTn>
-                              </p:par>
-                              <p:par>
-                                <p:cTn id="60" presetID="42" presetClass="entr" presetSubtype="0" fill="hold" nodeType="withEffect">
-                                  <p:stCondLst>
-                                    <p:cond delay="0"/>
-                                  </p:stCondLst>
-                                  <p:childTnLst>
-                                    <p:set>
-                                      <p:cBhvr>
-                                        <p:cTn id="61" dur="1" fill="hold">
-                                          <p:stCondLst>
-                                            <p:cond delay="0"/>
-                                          </p:stCondLst>
-                                        </p:cTn>
-                                        <p:tgtEl>
-                                          <p:spTgt spid="3">
-                                            <p:txEl>
-                                              <p:pRg st="9" end="9"/>
-                                            </p:txEl>
-                                          </p:spTgt>
-                                        </p:tgtEl>
-                                        <p:attrNameLst>
-                                          <p:attrName>style.visibility</p:attrName>
-                                        </p:attrNameLst>
-                                      </p:cBhvr>
-                                      <p:to>
-                                        <p:strVal val="visible"/>
-                                      </p:to>
-                                    </p:set>
-                                    <p:animEffect transition="in" filter="fade">
-                                      <p:cBhvr>
-                                        <p:cTn id="62" dur="1000"/>
-                                        <p:tgtEl>
-                                          <p:spTgt spid="3">
-                                            <p:txEl>
-                                              <p:pRg st="9" end="9"/>
-                                            </p:txEl>
-                                          </p:spTgt>
-                                        </p:tgtEl>
-                                      </p:cBhvr>
-                                    </p:animEffect>
-                                    <p:anim calcmode="lin" valueType="num">
-                                      <p:cBhvr>
-                                        <p:cTn id="63" dur="1000" fill="hold"/>
-                                        <p:tgtEl>
-                                          <p:spTgt spid="3">
-                                            <p:txEl>
-                                              <p:pRg st="9" end="9"/>
-                                            </p:txEl>
-                                          </p:spTgt>
-                                        </p:tgtEl>
-                                        <p:attrNameLst>
-                                          <p:attrName>ppt_x</p:attrName>
-                                        </p:attrNameLst>
-                                      </p:cBhvr>
-                                      <p:tavLst>
-                                        <p:tav tm="0">
-                                          <p:val>
-                                            <p:strVal val="#ppt_x"/>
-                                          </p:val>
-                                        </p:tav>
-                                        <p:tav tm="100000">
-                                          <p:val>
-                                            <p:strVal val="#ppt_x"/>
-                                          </p:val>
-                                        </p:tav>
-                                      </p:tavLst>
-                                    </p:anim>
-                                    <p:anim calcmode="lin" valueType="num">
-                                      <p:cBhvr>
-                                        <p:cTn id="64" dur="1000" fill="hold"/>
-                                        <p:tgtEl>
-                                          <p:spTgt spid="3">
-                                            <p:txEl>
-                                              <p:pRg st="9" end="9"/>
                                             </p:txEl>
                                           </p:spTgt>
                                         </p:tgtEl>
@@ -16339,4 +16103,10 @@
     </a:ext>
   </a:extLst>
 </a:theme>
+</file>
+
+<file path=docMetadata/LabelInfo.xml><?xml version="1.0" encoding="utf-8"?>
+<clbl:labelList xmlns:clbl="http://schemas.microsoft.com/office/2020/mipLabelMetadata">
+  <clbl:label id="{f42aa342-8706-4288-bd11-ebb85995028c}" enabled="1" method="Standard" siteId="{72f988bf-86f1-41af-91ab-2d7cd011db47}" contentBits="0" removed="0"/>
+</clbl:labelList>
 </file>
</xml_diff>